<commit_message>
LAP22G31-319 #comment minor changes
</commit_message>
<xml_diff>
--- a/docs/Sprint3/LAPR3 - Sprint 3 Status Report.pptx
+++ b/docs/Sprint3/LAPR3 - Sprint 3 Status Report.pptx
@@ -1080,7 +1080,15 @@
             </a:pPr>
             <a:r>
               <a:rPr lang="en-US" dirty="0"/>
-              <a:t>Sprint </a:t>
+              <a:t>Sprint 3</a:t>
+            </a:r>
+            <a:r>
+              <a:rPr lang="en-US" baseline="0" dirty="0"/>
+              <a:t> -</a:t>
+            </a:r>
+            <a:r>
+              <a:rPr lang="en-US" dirty="0"/>
+              <a:t> </a:t>
             </a:r>
             <a:r>
               <a:rPr lang="en-US" dirty="0" err="1"/>
@@ -1152,42 +1160,49 @@
             <c:symbol val="none"/>
           </c:marker>
           <c:cat>
-            <c:strRef>
-              <c:f>Folha1!$A$2:$A$5</c:f>
-              <c:strCache>
-                <c:ptCount val="4"/>
-                <c:pt idx="0">
-                  <c:v>dia 1</c:v>
+            <c:numRef>
+              <c:f>Folha1!$A$2:$A$6</c:f>
+              <c:numCache>
+                <c:formatCode>d\-mmm</c:formatCode>
+                <c:ptCount val="5"/>
+                <c:pt idx="0" formatCode="m/d/yyyy">
+                  <c:v>44539</c:v>
                 </c:pt>
                 <c:pt idx="1">
-                  <c:v>dia 5</c:v>
+                  <c:v>44545</c:v>
                 </c:pt>
                 <c:pt idx="2">
-                  <c:v>dia 10</c:v>
+                  <c:v>44547</c:v>
                 </c:pt>
                 <c:pt idx="3">
-                  <c:v>dia 15</c:v>
+                  <c:v>44552</c:v>
                 </c:pt>
-              </c:strCache>
-            </c:strRef>
+                <c:pt idx="4">
+                  <c:v>44564</c:v>
+                </c:pt>
+              </c:numCache>
+            </c:numRef>
           </c:cat>
           <c:val>
             <c:numRef>
-              <c:f>Folha1!$B$2:$B$5</c:f>
+              <c:f>Folha1!$B$2:$B$6</c:f>
               <c:numCache>
                 <c:formatCode>General</c:formatCode>
-                <c:ptCount val="4"/>
+                <c:ptCount val="5"/>
                 <c:pt idx="0">
-                  <c:v>36</c:v>
+                  <c:v>86</c:v>
                 </c:pt>
                 <c:pt idx="1">
-                  <c:v>32</c:v>
+                  <c:v>79</c:v>
                 </c:pt>
                 <c:pt idx="2">
-                  <c:v>22</c:v>
+                  <c:v>72</c:v>
                 </c:pt>
                 <c:pt idx="3">
-                  <c:v>0</c:v>
+                  <c:v>67</c:v>
+                </c:pt>
+                <c:pt idx="4">
+                  <c:v>55</c:v>
                 </c:pt>
               </c:numCache>
             </c:numRef>
@@ -1211,14 +1226,14 @@
         <c:axId val="634089088"/>
         <c:axId val="634090072"/>
       </c:lineChart>
-      <c:catAx>
+      <c:dateAx>
         <c:axId val="634089088"/>
         <c:scaling>
           <c:orientation val="minMax"/>
         </c:scaling>
         <c:delete val="0"/>
         <c:axPos val="b"/>
-        <c:numFmt formatCode="General" sourceLinked="1"/>
+        <c:numFmt formatCode="m/d/yyyy" sourceLinked="1"/>
         <c:majorTickMark val="none"/>
         <c:minorTickMark val="none"/>
         <c:tickLblPos val="nextTo"/>
@@ -1258,10 +1273,9 @@
         <c:crossAx val="634090072"/>
         <c:crosses val="autoZero"/>
         <c:auto val="1"/>
-        <c:lblAlgn val="ctr"/>
         <c:lblOffset val="100"/>
-        <c:noMultiLvlLbl val="0"/>
-      </c:catAx>
+        <c:baseTimeUnit val="days"/>
+      </c:dateAx>
       <c:valAx>
         <c:axId val="634090072"/>
         <c:scaling>
@@ -1420,7 +1434,7 @@
               <c:strCache>
                 <c:ptCount val="1"/>
                 <c:pt idx="0">
-                  <c:v>Métrica 1</c:v>
+                  <c:v>Velocidade</c:v>
                 </c:pt>
               </c:strCache>
             </c:strRef>
@@ -1441,9 +1455,9 @@
           </c:marker>
           <c:cat>
             <c:strRef>
-              <c:f>Folha1!$A$2:$A$5</c:f>
+              <c:f>Folha1!$A$2:$A$4</c:f>
               <c:strCache>
-                <c:ptCount val="4"/>
+                <c:ptCount val="3"/>
                 <c:pt idx="0">
                   <c:v>Sprint 1</c:v>
                 </c:pt>
@@ -1453,29 +1467,23 @@
                 <c:pt idx="2">
                   <c:v>Sprint 3</c:v>
                 </c:pt>
-                <c:pt idx="3">
-                  <c:v>Sprint 4</c:v>
-                </c:pt>
               </c:strCache>
             </c:strRef>
           </c:cat>
           <c:val>
             <c:numRef>
-              <c:f>Folha1!$B$2:$B$5</c:f>
+              <c:f>Folha1!$B$2:$B$4</c:f>
               <c:numCache>
                 <c:formatCode>General</c:formatCode>
-                <c:ptCount val="4"/>
+                <c:ptCount val="3"/>
                 <c:pt idx="0">
-                  <c:v>4.3</c:v>
+                  <c:v>4</c:v>
                 </c:pt>
                 <c:pt idx="1">
-                  <c:v>2.5</c:v>
+                  <c:v>2.8</c:v>
                 </c:pt>
                 <c:pt idx="2">
-                  <c:v>3.5</c:v>
-                </c:pt>
-                <c:pt idx="3">
-                  <c:v>4.5</c:v>
+                  <c:v>2</c:v>
                 </c:pt>
               </c:numCache>
             </c:numRef>
@@ -1496,7 +1504,7 @@
               <c:strCache>
                 <c:ptCount val="1"/>
                 <c:pt idx="0">
-                  <c:v>Métrica 2</c:v>
+                  <c:v>Controle (máximo desvio padrão)</c:v>
                 </c:pt>
               </c:strCache>
             </c:strRef>
@@ -1515,9 +1523,9 @@
           </c:marker>
           <c:cat>
             <c:strRef>
-              <c:f>Folha1!$A$2:$A$5</c:f>
+              <c:f>Folha1!$A$2:$A$4</c:f>
               <c:strCache>
-                <c:ptCount val="4"/>
+                <c:ptCount val="3"/>
                 <c:pt idx="0">
                   <c:v>Sprint 1</c:v>
                 </c:pt>
@@ -1527,29 +1535,23 @@
                 <c:pt idx="2">
                   <c:v>Sprint 3</c:v>
                 </c:pt>
-                <c:pt idx="3">
-                  <c:v>Sprint 4</c:v>
-                </c:pt>
               </c:strCache>
             </c:strRef>
           </c:cat>
           <c:val>
             <c:numRef>
-              <c:f>Folha1!$C$2:$C$5</c:f>
+              <c:f>Folha1!$C$2:$C$4</c:f>
               <c:numCache>
                 <c:formatCode>General</c:formatCode>
-                <c:ptCount val="4"/>
+                <c:ptCount val="3"/>
                 <c:pt idx="0">
-                  <c:v>2.4</c:v>
+                  <c:v>2.6</c:v>
                 </c:pt>
                 <c:pt idx="1">
-                  <c:v>4.4000000000000004</c:v>
+                  <c:v>4.5</c:v>
                 </c:pt>
                 <c:pt idx="2">
-                  <c:v>1.8</c:v>
-                </c:pt>
-                <c:pt idx="3">
-                  <c:v>2.8</c:v>
+                  <c:v>2.4</c:v>
                 </c:pt>
               </c:numCache>
             </c:numRef>
@@ -1570,7 +1572,7 @@
               <c:strCache>
                 <c:ptCount val="1"/>
                 <c:pt idx="0">
-                  <c:v>Métrica 3</c:v>
+                  <c:v>Burnup</c:v>
                 </c:pt>
               </c:strCache>
             </c:strRef>
@@ -1591,9 +1593,9 @@
           </c:marker>
           <c:cat>
             <c:strRef>
-              <c:f>Folha1!$A$2:$A$5</c:f>
+              <c:f>Folha1!$A$2:$A$4</c:f>
               <c:strCache>
-                <c:ptCount val="4"/>
+                <c:ptCount val="3"/>
                 <c:pt idx="0">
                   <c:v>Sprint 1</c:v>
                 </c:pt>
@@ -1603,29 +1605,23 @@
                 <c:pt idx="2">
                   <c:v>Sprint 3</c:v>
                 </c:pt>
-                <c:pt idx="3">
-                  <c:v>Sprint 4</c:v>
-                </c:pt>
               </c:strCache>
             </c:strRef>
           </c:cat>
           <c:val>
             <c:numRef>
-              <c:f>Folha1!$D$2:$D$5</c:f>
+              <c:f>Folha1!$D$2:$D$4</c:f>
               <c:numCache>
                 <c:formatCode>General</c:formatCode>
-                <c:ptCount val="4"/>
+                <c:ptCount val="3"/>
                 <c:pt idx="0">
-                  <c:v>2</c:v>
+                  <c:v>1</c:v>
                 </c:pt>
                 <c:pt idx="1">
-                  <c:v>2</c:v>
+                  <c:v>0.61</c:v>
                 </c:pt>
                 <c:pt idx="2">
-                  <c:v>3</c:v>
-                </c:pt>
-                <c:pt idx="3">
-                  <c:v>5</c:v>
+                  <c:v>0.3</c:v>
                 </c:pt>
               </c:numCache>
             </c:numRef>
@@ -3991,7 +3987,7 @@
             <a:fld id="{5D8AA918-AAAF-A948-AD9D-7282A6CA6554}" type="datetimeFigureOut">
               <a:rPr lang="en-US" smtClean="0"/>
               <a:pPr/>
-              <a:t>1/4/2022</a:t>
+              <a:t>1/14/2022</a:t>
             </a:fld>
             <a:endParaRPr lang="pt-PT"/>
           </a:p>
@@ -4343,7 +4339,7 @@
             <a:fld id="{44B11A7A-C2E1-40A3-A304-BADFC0305F97}" type="datetimeFigureOut">
               <a:rPr lang="pt-PT" smtClean="0"/>
               <a:pPr/>
-              <a:t>04/01/2022</a:t>
+              <a:t>14/01/2022</a:t>
             </a:fld>
             <a:endParaRPr lang="pt-PT"/>
           </a:p>
@@ -4609,7 +4605,7 @@
             <a:fld id="{44B11A7A-C2E1-40A3-A304-BADFC0305F97}" type="datetimeFigureOut">
               <a:rPr lang="pt-PT" smtClean="0"/>
               <a:pPr/>
-              <a:t>04/01/2022</a:t>
+              <a:t>14/01/2022</a:t>
             </a:fld>
             <a:endParaRPr lang="pt-PT"/>
           </a:p>
@@ -4783,7 +4779,7 @@
             <a:fld id="{44B11A7A-C2E1-40A3-A304-BADFC0305F97}" type="datetimeFigureOut">
               <a:rPr lang="pt-PT" smtClean="0"/>
               <a:pPr/>
-              <a:t>04/01/2022</a:t>
+              <a:t>14/01/2022</a:t>
             </a:fld>
             <a:endParaRPr lang="pt-PT"/>
           </a:p>
@@ -4993,7 +4989,7 @@
             <a:fld id="{44B11A7A-C2E1-40A3-A304-BADFC0305F97}" type="datetimeFigureOut">
               <a:rPr lang="pt-PT" smtClean="0"/>
               <a:pPr/>
-              <a:t>04/01/2022</a:t>
+              <a:t>14/01/2022</a:t>
             </a:fld>
             <a:endParaRPr lang="pt-PT"/>
           </a:p>
@@ -5344,7 +5340,7 @@
             <a:fld id="{44B11A7A-C2E1-40A3-A304-BADFC0305F97}" type="datetimeFigureOut">
               <a:rPr lang="pt-PT" smtClean="0"/>
               <a:pPr/>
-              <a:t>04/01/2022</a:t>
+              <a:t>14/01/2022</a:t>
             </a:fld>
             <a:endParaRPr lang="pt-PT"/>
           </a:p>
@@ -5439,7 +5435,7 @@
             <a:fld id="{44B11A7A-C2E1-40A3-A304-BADFC0305F97}" type="datetimeFigureOut">
               <a:rPr lang="pt-PT" smtClean="0"/>
               <a:pPr/>
-              <a:t>04/01/2022</a:t>
+              <a:t>14/01/2022</a:t>
             </a:fld>
             <a:endParaRPr lang="pt-PT"/>
           </a:p>
@@ -5805,7 +5801,7 @@
             <a:fld id="{44B11A7A-C2E1-40A3-A304-BADFC0305F97}" type="datetimeFigureOut">
               <a:rPr lang="pt-PT" smtClean="0"/>
               <a:pPr/>
-              <a:t>04/01/2022</a:t>
+              <a:t>14/01/2022</a:t>
             </a:fld>
             <a:endParaRPr lang="pt-PT"/>
           </a:p>
@@ -5930,7 +5926,7 @@
             <a:fld id="{44B11A7A-C2E1-40A3-A304-BADFC0305F97}" type="datetimeFigureOut">
               <a:rPr lang="pt-PT" smtClean="0"/>
               <a:pPr/>
-              <a:t>04/01/2022</a:t>
+              <a:t>14/01/2022</a:t>
             </a:fld>
             <a:endParaRPr lang="pt-PT"/>
           </a:p>
@@ -6014,7 +6010,7 @@
             <a:fld id="{44B11A7A-C2E1-40A3-A304-BADFC0305F97}" type="datetimeFigureOut">
               <a:rPr lang="pt-PT" smtClean="0"/>
               <a:pPr/>
-              <a:t>04/01/2022</a:t>
+              <a:t>14/01/2022</a:t>
             </a:fld>
             <a:endParaRPr lang="pt-PT"/>
           </a:p>
@@ -7148,7 +7144,7 @@
           <a:lstStyle/>
           <a:p>
             <a:r>
-              <a:rPr lang="en-US" u="sng">
+              <a:rPr lang="en-US" u="sng" dirty="0">
                 <a:solidFill>
                   <a:schemeClr val="tx1"/>
                 </a:solidFill>
@@ -7161,7 +7157,56 @@
               <a:buFont typeface="Arial" panose="020B0604020202020204" pitchFamily="34" charset="0"/>
               <a:buChar char="•"/>
             </a:pPr>
-            <a:endParaRPr lang="en-US" sz="1400">
+            <a:r>
+              <a:rPr lang="en-US" sz="1400" b="0" i="0" dirty="0">
+                <a:solidFill>
+                  <a:srgbClr val="171717"/>
+                </a:solidFill>
+                <a:effectLst/>
+                <a:latin typeface="Lato" panose="020B0604020202020204" pitchFamily="34" charset="0"/>
+              </a:rPr>
+              <a:t>Try timeboxing of 2 minutes per person in the daily meeting until the next sprint retrospective</a:t>
+            </a:r>
+          </a:p>
+          <a:p>
+            <a:pPr marL="285750" indent="-285750">
+              <a:buFont typeface="Arial" panose="020B0604020202020204" pitchFamily="34" charset="0"/>
+              <a:buChar char="•"/>
+            </a:pPr>
+            <a:r>
+              <a:rPr lang="en-US" sz="1400" dirty="0">
+                <a:solidFill>
+                  <a:srgbClr val="171717"/>
+                </a:solidFill>
+                <a:latin typeface="Lato" panose="020B0604020202020204" pitchFamily="34" charset="0"/>
+              </a:rPr>
+              <a:t>Find more accurate ways to estimate the issues</a:t>
+            </a:r>
+          </a:p>
+          <a:p>
+            <a:pPr marL="285750" indent="-285750">
+              <a:buFont typeface="Arial" panose="020B0604020202020204" pitchFamily="34" charset="0"/>
+              <a:buChar char="•"/>
+            </a:pPr>
+            <a:r>
+              <a:rPr lang="en-US" sz="1400" dirty="0">
+                <a:solidFill>
+                  <a:srgbClr val="171717"/>
+                </a:solidFill>
+                <a:latin typeface="Lato" panose="020B0604020202020204" pitchFamily="34" charset="0"/>
+              </a:rPr>
+              <a:t>Try to avoid </a:t>
+            </a:r>
+            <a:r>
+              <a:rPr lang="en-US" sz="1400">
+                <a:solidFill>
+                  <a:srgbClr val="171717"/>
+                </a:solidFill>
+                <a:latin typeface="Lato" panose="020B0604020202020204" pitchFamily="34" charset="0"/>
+              </a:rPr>
+              <a:t>unnecessary meetings</a:t>
+            </a:r>
+            <a:endParaRPr lang="en-US" sz="1400" dirty="0">
               <a:solidFill>
                 <a:schemeClr val="tx1"/>
               </a:solidFill>
@@ -7172,7 +7217,7 @@
               <a:buFont typeface="Arial" panose="020B0604020202020204" pitchFamily="34" charset="0"/>
               <a:buChar char="•"/>
             </a:pPr>
-            <a:endParaRPr lang="en-US" sz="1400">
+            <a:endParaRPr lang="en-US" sz="1400" dirty="0">
               <a:solidFill>
                 <a:schemeClr val="tx1"/>
               </a:solidFill>
@@ -7262,7 +7307,7 @@
             <p:ph idx="1"/>
             <p:extLst>
               <p:ext uri="{D42A27DB-BD31-4B8C-83A1-F6EECF244321}">
-                <p14:modId xmlns:p14="http://schemas.microsoft.com/office/powerpoint/2010/main" val="2298813611"/>
+                <p14:modId xmlns:p14="http://schemas.microsoft.com/office/powerpoint/2010/main" val="2142672089"/>
               </p:ext>
             </p:extLst>
           </p:nvPr>
@@ -20113,31 +20158,7 @@
                   <a:schemeClr val="tx1"/>
                 </a:solidFill>
               </a:rPr>
-              <a:t>Sprint </a:t>
-            </a:r>
-            <a:r>
-              <a:rPr lang="pt-PT" sz="3200" cap="none" dirty="0" err="1">
-                <a:solidFill>
-                  <a:schemeClr val="tx1"/>
-                </a:solidFill>
-              </a:rPr>
-              <a:t>Burndown</a:t>
-            </a:r>
-            <a:r>
-              <a:rPr lang="pt-PT" sz="3200" cap="none" dirty="0">
-                <a:solidFill>
-                  <a:schemeClr val="tx1"/>
-                </a:solidFill>
-              </a:rPr>
-              <a:t> </a:t>
-            </a:r>
-            <a:r>
-              <a:rPr lang="pt-PT" sz="3200" cap="none" dirty="0" err="1">
-                <a:solidFill>
-                  <a:schemeClr val="tx1"/>
-                </a:solidFill>
-              </a:rPr>
-              <a:t>Chart</a:t>
+              <a:t>Sprint 3 - Burndown Chart</a:t>
             </a:r>
             <a:endParaRPr lang="pt-PT" sz="3200" cap="none" dirty="0"/>
           </a:p>
@@ -20204,7 +20225,7 @@
           <p:nvPr>
             <p:extLst>
               <p:ext uri="{D42A27DB-BD31-4B8C-83A1-F6EECF244321}">
-                <p14:modId xmlns:p14="http://schemas.microsoft.com/office/powerpoint/2010/main" val="4040836741"/>
+                <p14:modId xmlns:p14="http://schemas.microsoft.com/office/powerpoint/2010/main" val="3772211633"/>
               </p:ext>
             </p:extLst>
           </p:nvPr>
@@ -21000,15 +21021,6 @@
 </file>
 
 <file path=customXml/item2.xml><?xml version="1.0" encoding="utf-8"?>
-<?mso-contentType ?>
-<FormTemplates xmlns="http://schemas.microsoft.com/sharepoint/v3/contenttype/forms">
-  <Display>DocumentLibraryForm</Display>
-  <Edit>DocumentLibraryForm</Edit>
-  <New>DocumentLibraryForm</New>
-</FormTemplates>
-</file>
-
-<file path=customXml/item3.xml><?xml version="1.0" encoding="utf-8"?>
 <ct:contentTypeSchema xmlns:ct="http://schemas.microsoft.com/office/2006/metadata/contentType" xmlns:ma="http://schemas.microsoft.com/office/2006/metadata/properties/metaAttributes" ct:_="" ma:_="" ma:contentTypeName="Document" ma:contentTypeID="0x0101005836243B3C47804EAF5FFDD9F066FCC7" ma:contentTypeVersion="2" ma:contentTypeDescription="Create a new document." ma:contentTypeScope="" ma:versionID="0469372245184f18195408053fbf9b6d">
   <xsd:schema xmlns:xsd="http://www.w3.org/2001/XMLSchema" xmlns:xs="http://www.w3.org/2001/XMLSchema" xmlns:p="http://schemas.microsoft.com/office/2006/metadata/properties" xmlns:ns2="a1e3ca88-8ae5-4fd0-ba37-40ce669fcbb0" targetNamespace="http://schemas.microsoft.com/office/2006/metadata/properties" ma:root="true" ma:fieldsID="15cd5fdf54d7c5df31b4840e959455b1" ns2:_="">
     <xsd:import namespace="a1e3ca88-8ae5-4fd0-ba37-40ce669fcbb0"/>
@@ -21140,6 +21152,15 @@
 </ct:contentTypeSchema>
 </file>
 
+<file path=customXml/item3.xml><?xml version="1.0" encoding="utf-8"?>
+<?mso-contentType ?>
+<FormTemplates xmlns="http://schemas.microsoft.com/sharepoint/v3/contenttype/forms">
+  <Display>DocumentLibraryForm</Display>
+  <Edit>DocumentLibraryForm</Edit>
+  <New>DocumentLibraryForm</New>
+</FormTemplates>
+</file>
+
 <file path=customXml/itemProps1.xml><?xml version="1.0" encoding="utf-8"?>
 <ds:datastoreItem xmlns:ds="http://schemas.openxmlformats.org/officeDocument/2006/customXml" ds:itemID="{E9B87164-EF5F-43C8-917E-48B38ACAFD1E}">
   <ds:schemaRefs>
@@ -21157,14 +21178,6 @@
 </file>
 
 <file path=customXml/itemProps2.xml><?xml version="1.0" encoding="utf-8"?>
-<ds:datastoreItem xmlns:ds="http://schemas.openxmlformats.org/officeDocument/2006/customXml" ds:itemID="{4F984168-AABC-4753-B4EC-59CA9D08839F}">
-  <ds:schemaRefs>
-    <ds:schemaRef ds:uri="http://schemas.microsoft.com/sharepoint/v3/contenttype/forms"/>
-  </ds:schemaRefs>
-</ds:datastoreItem>
-</file>
-
-<file path=customXml/itemProps3.xml><?xml version="1.0" encoding="utf-8"?>
 <ds:datastoreItem xmlns:ds="http://schemas.openxmlformats.org/officeDocument/2006/customXml" ds:itemID="{2092E48C-C6FF-44AE-8C78-D9681B66D30B}">
   <ds:schemaRefs>
     <ds:schemaRef ds:uri="http://schemas.microsoft.com/office/2006/metadata/contentType"/>
@@ -21180,4 +21193,12 @@
     <ds:schemaRef ds:uri="http://schemas.microsoft.com/internal/obd"/>
   </ds:schemaRefs>
 </ds:datastoreItem>
+</file>
+
+<file path=customXml/itemProps3.xml><?xml version="1.0" encoding="utf-8"?>
+<ds:datastoreItem xmlns:ds="http://schemas.openxmlformats.org/officeDocument/2006/customXml" ds:itemID="{4F984168-AABC-4753-B4EC-59CA9D08839F}">
+  <ds:schemaRefs>
+    <ds:schemaRef ds:uri="http://schemas.microsoft.com/sharepoint/v3/contenttype/forms"/>
+  </ds:schemaRefs>
+</ds:datastoreItem>
 </file>
</xml_diff>